<commit_message>
update block ciphers lite
</commit_message>
<xml_diff>
--- a/Lectures/BlockCiphersLite.pptx
+++ b/Lectures/BlockCiphersLite.pptx
@@ -234,7 +234,7 @@
           <a:p>
             <a:fld id="{CBA08D16-15DC-4E25-BDC3-F25146157B16}" type="datetimeFigureOut">
               <a:rPr lang="ru-RU" smtClean="0"/>
-              <a:t>08.02.2024</a:t>
+              <a:t>13.02.2025</a:t>
             </a:fld>
             <a:endParaRPr lang="ru-RU"/>
           </a:p>
@@ -633,7 +633,7 @@
           <a:p>
             <a:fld id="{FCEC8293-DB51-454A-BE81-EC8FCB31EBA2}" type="datetime1">
               <a:rPr lang="ru-RU" smtClean="0"/>
-              <a:t>08.02.2024</a:t>
+              <a:t>13.02.2025</a:t>
             </a:fld>
             <a:endParaRPr lang="ru-RU"/>
           </a:p>
@@ -807,7 +807,7 @@
           <a:p>
             <a:fld id="{241C87B1-1C35-4DBD-BC18-2BC72E776603}" type="datetime1">
               <a:rPr lang="ru-RU" smtClean="0"/>
-              <a:t>08.02.2024</a:t>
+              <a:t>13.02.2025</a:t>
             </a:fld>
             <a:endParaRPr lang="ru-RU"/>
           </a:p>
@@ -991,7 +991,7 @@
           <a:p>
             <a:fld id="{3134C275-26C0-42CD-9111-9ADE65922AF9}" type="datetime1">
               <a:rPr lang="ru-RU" smtClean="0"/>
-              <a:t>08.02.2024</a:t>
+              <a:t>13.02.2025</a:t>
             </a:fld>
             <a:endParaRPr lang="ru-RU"/>
           </a:p>
@@ -1165,7 +1165,7 @@
           <a:p>
             <a:fld id="{C1A9A50B-C350-45F5-8AAB-ADB9E670AF2E}" type="datetime1">
               <a:rPr lang="ru-RU" smtClean="0"/>
-              <a:t>08.02.2024</a:t>
+              <a:t>13.02.2025</a:t>
             </a:fld>
             <a:endParaRPr lang="ru-RU"/>
           </a:p>
@@ -1415,7 +1415,7 @@
           <a:p>
             <a:fld id="{089688C9-348F-42F9-B6C0-5990DDE0C5B2}" type="datetime1">
               <a:rPr lang="ru-RU" smtClean="0"/>
-              <a:t>08.02.2024</a:t>
+              <a:t>13.02.2025</a:t>
             </a:fld>
             <a:endParaRPr lang="ru-RU"/>
           </a:p>
@@ -1651,7 +1651,7 @@
           <a:p>
             <a:fld id="{684AFD8F-6DD9-4AD3-A505-FDC3F5C5F3F6}" type="datetime1">
               <a:rPr lang="ru-RU" smtClean="0"/>
-              <a:t>08.02.2024</a:t>
+              <a:t>13.02.2025</a:t>
             </a:fld>
             <a:endParaRPr lang="ru-RU"/>
           </a:p>
@@ -2022,7 +2022,7 @@
           <a:p>
             <a:fld id="{63551EFE-4D02-45EB-A747-8B6F047B5AA0}" type="datetime1">
               <a:rPr lang="ru-RU" smtClean="0"/>
-              <a:t>08.02.2024</a:t>
+              <a:t>13.02.2025</a:t>
             </a:fld>
             <a:endParaRPr lang="ru-RU"/>
           </a:p>
@@ -2144,7 +2144,7 @@
           <a:p>
             <a:fld id="{813A9F34-E5CD-4B8F-AA9E-889C84372B20}" type="datetime1">
               <a:rPr lang="ru-RU" smtClean="0"/>
-              <a:t>08.02.2024</a:t>
+              <a:t>13.02.2025</a:t>
             </a:fld>
             <a:endParaRPr lang="ru-RU"/>
           </a:p>
@@ -2243,7 +2243,7 @@
           <a:p>
             <a:fld id="{51224D22-9B29-44A6-8E82-95FC492DEDC1}" type="datetime1">
               <a:rPr lang="ru-RU" smtClean="0"/>
-              <a:t>08.02.2024</a:t>
+              <a:t>13.02.2025</a:t>
             </a:fld>
             <a:endParaRPr lang="ru-RU"/>
           </a:p>
@@ -2524,7 +2524,7 @@
           <a:p>
             <a:fld id="{91D1034F-4441-48A1-BDC0-25EA1022324A}" type="datetime1">
               <a:rPr lang="ru-RU" smtClean="0"/>
-              <a:t>08.02.2024</a:t>
+              <a:t>13.02.2025</a:t>
             </a:fld>
             <a:endParaRPr lang="ru-RU"/>
           </a:p>
@@ -2781,7 +2781,7 @@
           <a:p>
             <a:fld id="{B0FFDE79-B627-473B-AE17-4C65BD2495F7}" type="datetime1">
               <a:rPr lang="ru-RU" smtClean="0"/>
-              <a:t>08.02.2024</a:t>
+              <a:t>13.02.2025</a:t>
             </a:fld>
             <a:endParaRPr lang="ru-RU"/>
           </a:p>
@@ -2998,7 +2998,7 @@
           <a:p>
             <a:fld id="{11CA537A-1B8C-47BA-9BA6-7CE3FAFDA8BE}" type="datetime1">
               <a:rPr lang="ru-RU" smtClean="0"/>
-              <a:t>08.02.2024</a:t>
+              <a:t>13.02.2025</a:t>
             </a:fld>
             <a:endParaRPr lang="ru-RU"/>
           </a:p>
@@ -3469,7 +3469,11 @@
           <a:p>
             <a:r>
               <a:rPr lang="ru-RU" dirty="0" smtClean="0"/>
-              <a:t>МИФИ 2024</a:t>
+              <a:t>МИФИ </a:t>
+            </a:r>
+            <a:r>
+              <a:rPr lang="ru-RU" dirty="0" smtClean="0"/>
+              <a:t>2025</a:t>
             </a:r>
             <a:endParaRPr lang="ru-RU" dirty="0"/>
           </a:p>
@@ -3573,8 +3577,8 @@
           </a:p>
         </p:txBody>
       </p:sp>
-      <mc:AlternateContent xmlns:mc="http://schemas.openxmlformats.org/markup-compatibility/2006" xmlns:a14="http://schemas.microsoft.com/office/drawing/2010/main">
-        <mc:Choice Requires="a14">
+      <mc:AlternateContent xmlns:mc="http://schemas.openxmlformats.org/markup-compatibility/2006">
+        <mc:Choice xmlns:a14="http://schemas.microsoft.com/office/drawing/2010/main" Requires="a14">
           <p:sp>
             <p:nvSpPr>
               <p:cNvPr id="3" name="Объект 2"/>
@@ -3587,7 +3591,9 @@
             </p:nvSpPr>
             <p:spPr/>
             <p:txBody>
-              <a:bodyPr/>
+              <a:bodyPr>
+                <a:normAutofit lnSpcReduction="10000"/>
+              </a:bodyPr>
               <a:lstStyle/>
               <a:p>
                 <a:pPr marL="0" indent="0">
@@ -3776,6 +3782,101 @@
                 <a:endParaRPr lang="en-US" dirty="0"/>
               </a:p>
               <a:p>
+                <a:pPr marL="0" indent="0">
+                  <a:buNone/>
+                </a:pPr>
+                <a:r>
+                  <a:rPr lang="ru-RU" dirty="0" smtClean="0"/>
+                  <a:t>Формальное определение – посмотреть самостоятельно. Суть коротко – вероятность для фиксированного </a:t>
+                </a:r>
+                <a:r>
+                  <a:rPr lang="ru-RU" dirty="0" err="1" smtClean="0"/>
+                  <a:t>шифртекста</a:t>
+                </a:r>
+                <a:r>
+                  <a:rPr lang="ru-RU" dirty="0" smtClean="0"/>
+                  <a:t> </a:t>
+                </a:r>
+                <a14:m>
+                  <m:oMath xmlns:m="http://schemas.openxmlformats.org/officeDocument/2006/math">
+                    <m:r>
+                      <a:rPr lang="ru-RU" b="0" i="1" smtClean="0">
+                        <a:latin typeface="Cambria Math" panose="02040503050406030204" pitchFamily="18" charset="0"/>
+                      </a:rPr>
+                      <m:t>с</m:t>
+                    </m:r>
+                  </m:oMath>
+                </a14:m>
+                <a:r>
+                  <a:rPr lang="ru-RU" dirty="0" smtClean="0"/>
+                  <a:t> соответствовать одному из открытых текстов </a:t>
+                </a:r>
+                <a14:m>
+                  <m:oMath xmlns:m="http://schemas.openxmlformats.org/officeDocument/2006/math">
+                    <m:sSub>
+                      <m:sSubPr>
+                        <m:ctrlPr>
+                          <a:rPr lang="en-US" b="0" i="1" smtClean="0">
+                            <a:latin typeface="Cambria Math" panose="02040503050406030204" pitchFamily="18" charset="0"/>
+                          </a:rPr>
+                        </m:ctrlPr>
+                      </m:sSubPr>
+                      <m:e>
+                        <m:r>
+                          <a:rPr lang="en-US" b="0" i="1" smtClean="0">
+                            <a:latin typeface="Cambria Math" panose="02040503050406030204" pitchFamily="18" charset="0"/>
+                          </a:rPr>
+                          <m:t>𝑚</m:t>
+                        </m:r>
+                      </m:e>
+                      <m:sub>
+                        <m:r>
+                          <a:rPr lang="ru-RU" b="0" i="1" smtClean="0">
+                            <a:latin typeface="Cambria Math" panose="02040503050406030204" pitchFamily="18" charset="0"/>
+                          </a:rPr>
+                          <m:t>0</m:t>
+                        </m:r>
+                      </m:sub>
+                    </m:sSub>
+                    <m:r>
+                      <a:rPr lang="en-US" b="0" i="1" smtClean="0">
+                        <a:latin typeface="Cambria Math" panose="02040503050406030204" pitchFamily="18" charset="0"/>
+                      </a:rPr>
+                      <m:t>,</m:t>
+                    </m:r>
+                    <m:sSub>
+                      <m:sSubPr>
+                        <m:ctrlPr>
+                          <a:rPr lang="en-US" b="0" i="1" smtClean="0">
+                            <a:latin typeface="Cambria Math" panose="02040503050406030204" pitchFamily="18" charset="0"/>
+                          </a:rPr>
+                        </m:ctrlPr>
+                      </m:sSubPr>
+                      <m:e>
+                        <m:r>
+                          <a:rPr lang="en-US" b="0" i="1" smtClean="0">
+                            <a:latin typeface="Cambria Math" panose="02040503050406030204" pitchFamily="18" charset="0"/>
+                          </a:rPr>
+                          <m:t>𝑚</m:t>
+                        </m:r>
+                      </m:e>
+                      <m:sub>
+                        <m:r>
+                          <a:rPr lang="ru-RU" b="0" i="1" smtClean="0">
+                            <a:latin typeface="Cambria Math" panose="02040503050406030204" pitchFamily="18" charset="0"/>
+                          </a:rPr>
+                          <m:t>1</m:t>
+                        </m:r>
+                      </m:sub>
+                    </m:sSub>
+                  </m:oMath>
+                </a14:m>
+                <a:r>
+                  <a:rPr lang="ru-RU" dirty="0" smtClean="0"/>
+                  <a:t> одинакова при незнании ключа.</a:t>
+                </a:r>
+              </a:p>
+              <a:p>
                 <a:endParaRPr lang="en-US" dirty="0" smtClean="0"/>
               </a:p>
               <a:p>
@@ -3835,7 +3936,7 @@
             </p:txBody>
           </p:sp>
         </mc:Choice>
-        <mc:Fallback xmlns="">
+        <mc:Fallback>
           <p:sp>
             <p:nvSpPr>
               <p:cNvPr id="3" name="Объект 2"/>
@@ -3847,10 +3948,10 @@
               </p:nvPr>
             </p:nvSpPr>
             <p:spPr>
-              <a:blipFill>
+              <a:blipFill rotWithShape="0">
                 <a:blip r:embed="rId2"/>
                 <a:stretch>
-                  <a:fillRect l="-1043" t="-2101" r="-290"/>
+                  <a:fillRect l="-1043" t="-2801" r="-290" b="-3641"/>
                 </a:stretch>
               </a:blipFill>
             </p:spPr>
@@ -9203,7 +9304,27 @@
                   <a:rPr lang="ru-RU" dirty="0" smtClean="0">
                     <a:sym typeface="Symbol" pitchFamily="18" charset="2"/>
                   </a:rPr>
-                  <a:t> - выбор случайного элемента множества)</a:t>
+                  <a:t> - выбор случайного элемента множества</a:t>
+                </a:r>
+                <a:r>
+                  <a:rPr lang="ru-RU" dirty="0" smtClean="0">
+                    <a:sym typeface="Symbol" pitchFamily="18" charset="2"/>
+                  </a:rPr>
+                  <a:t>)</a:t>
+                </a:r>
+              </a:p>
+              <a:p>
+                <a:pPr marL="0" indent="0">
+                  <a:lnSpc>
+                    <a:spcPct val="120000"/>
+                  </a:lnSpc>
+                  <a:buNone/>
+                </a:pPr>
+                <a:r>
+                  <a:rPr lang="ru-RU" dirty="0" smtClean="0">
+                    <a:sym typeface="Symbol" pitchFamily="18" charset="2"/>
+                  </a:rPr>
+                  <a:t>Используется в качестве модели блочного шифра при анализе схем</a:t>
                 </a:r>
                 <a:endParaRPr lang="ru-RU" dirty="0">
                   <a:sym typeface="Symbol" pitchFamily="18" charset="2"/>
@@ -9228,7 +9349,7 @@
                 <a:off x="838200" y="1473958"/>
                 <a:ext cx="11008056" cy="4882391"/>
               </a:xfrm>
-              <a:blipFill>
+              <a:blipFill rotWithShape="0">
                 <a:blip r:embed="rId2"/>
                 <a:stretch>
                   <a:fillRect l="-997"/>
@@ -9751,8 +9872,21 @@
           <a:p>
             <a:r>
               <a:rPr lang="ru-RU" dirty="0" smtClean="0"/>
-              <a:t>Запрещается использовать части кода, полученные из открытых источников, включая генеративные сети</a:t>
-            </a:r>
+              <a:t>Запрещается использовать части кода, полученные из открытых источников, включая генеративные </a:t>
+            </a:r>
+            <a:r>
+              <a:rPr lang="ru-RU" dirty="0" smtClean="0"/>
+              <a:t>сети</a:t>
+            </a:r>
+            <a:endParaRPr lang="en-US" dirty="0" smtClean="0"/>
+          </a:p>
+          <a:p>
+            <a:pPr lvl="1"/>
+            <a:r>
+              <a:rPr lang="ru-RU" dirty="0" smtClean="0"/>
+              <a:t>Пойманные на нарушении данного правила лишаются возможности сдавать лабораторные</a:t>
+            </a:r>
+            <a:endParaRPr lang="ru-RU" dirty="0" smtClean="0"/>
           </a:p>
           <a:p>
             <a:r>
@@ -9763,18 +9897,11 @@
           <a:p>
             <a:r>
               <a:rPr lang="ru-RU" dirty="0" smtClean="0"/>
-              <a:t>Лабораторная работа должна быть загружена в соответствующий </a:t>
-            </a:r>
-            <a:r>
-              <a:rPr lang="ru-RU" dirty="0" err="1" smtClean="0"/>
-              <a:t>репозиторий</a:t>
-            </a:r>
-            <a:endParaRPr lang="ru-RU" dirty="0" smtClean="0"/>
-          </a:p>
-          <a:p>
+              <a:t>На </a:t>
+            </a:r>
             <a:r>
               <a:rPr lang="ru-RU" dirty="0" smtClean="0"/>
-              <a:t>На выполнение каждой работы 3 недели, каждые 2 недели новая лабораторная работа</a:t>
+              <a:t>выполнение каждой работы 3 недели, каждые 2 недели новая лабораторная работа</a:t>
             </a:r>
           </a:p>
           <a:p>
@@ -18063,8 +18190,8 @@
           </a:p>
         </p:txBody>
       </p:sp>
-      <mc:AlternateContent xmlns:mc="http://schemas.openxmlformats.org/markup-compatibility/2006">
-        <mc:Choice xmlns:a14="http://schemas.microsoft.com/office/drawing/2010/main" Requires="a14">
+      <mc:AlternateContent xmlns:mc="http://schemas.openxmlformats.org/markup-compatibility/2006" xmlns:a14="http://schemas.microsoft.com/office/drawing/2010/main">
+        <mc:Choice Requires="a14">
           <p:sp>
             <p:nvSpPr>
               <p:cNvPr id="3" name="Объект 2"/>
@@ -18872,7 +18999,7 @@
             </p:txBody>
           </p:sp>
         </mc:Choice>
-        <mc:Fallback>
+        <mc:Fallback xmlns="">
           <p:sp>
             <p:nvSpPr>
               <p:cNvPr id="3" name="Объект 2"/>

</xml_diff>